<commit_message>
MAJ tuto, petite correction
</commit_message>
<xml_diff>
--- a/TUTO_MultiRechercheExcel.pptx
+++ b/TUTO_MultiRechercheExcel.pptx
@@ -5,14 +5,15 @@
     <p:sldMasterId id="2147483660" r:id="rId1"/>
   </p:sldMasterIdLst>
   <p:notesMasterIdLst>
-    <p:notesMasterId r:id="rId7"/>
+    <p:notesMasterId r:id="rId8"/>
   </p:notesMasterIdLst>
   <p:sldIdLst>
     <p:sldId id="258" r:id="rId2"/>
     <p:sldId id="259" r:id="rId3"/>
     <p:sldId id="262" r:id="rId4"/>
     <p:sldId id="263" r:id="rId5"/>
-    <p:sldId id="264" r:id="rId6"/>
+    <p:sldId id="265" r:id="rId6"/>
+    <p:sldId id="264" r:id="rId7"/>
   </p:sldIdLst>
   <p:sldSz cx="9144000" cy="6858000" type="screen4x3"/>
   <p:notesSz cx="6858000" cy="9144000"/>
@@ -213,7 +214,7 @@
             <a:fld id="{BDF2A71B-5DC1-4CC3-81B5-30C08E317B94}" type="datetimeFigureOut">
               <a:rPr lang="fr-FR" smtClean="0"/>
               <a:pPr/>
-              <a:t>04/06/2022</a:t>
+              <a:t>08/02/2023</a:t>
             </a:fld>
             <a:endParaRPr lang="fr-FR"/>
           </a:p>
@@ -569,6 +570,202 @@
 </p:notes>
 </file>
 
+<file path=ppt/notesSlides/notesSlide2.xml><?xml version="1.0" encoding="utf-8"?>
+<p:notes xmlns:a="http://schemas.openxmlformats.org/drawingml/2006/main" xmlns:r="http://schemas.openxmlformats.org/officeDocument/2006/relationships" xmlns:p="http://schemas.openxmlformats.org/presentationml/2006/main">
+  <p:cSld>
+    <p:spTree>
+      <p:nvGrpSpPr>
+        <p:cNvPr id="1" name=""/>
+        <p:cNvGrpSpPr/>
+        <p:nvPr/>
+      </p:nvGrpSpPr>
+      <p:grpSpPr>
+        <a:xfrm>
+          <a:off x="0" y="0"/>
+          <a:ext cx="0" cy="0"/>
+          <a:chOff x="0" y="0"/>
+          <a:chExt cx="0" cy="0"/>
+        </a:xfrm>
+      </p:grpSpPr>
+      <p:sp>
+        <p:nvSpPr>
+          <p:cNvPr id="2" name="Espace réservé de l'image des diapositives 1"/>
+          <p:cNvSpPr>
+            <a:spLocks noGrp="1" noRot="1" noChangeAspect="1"/>
+          </p:cNvSpPr>
+          <p:nvPr>
+            <p:ph type="sldImg"/>
+          </p:nvPr>
+        </p:nvSpPr>
+        <p:spPr/>
+      </p:sp>
+      <p:sp>
+        <p:nvSpPr>
+          <p:cNvPr id="3" name="Espace réservé des commentaires 2"/>
+          <p:cNvSpPr>
+            <a:spLocks noGrp="1"/>
+          </p:cNvSpPr>
+          <p:nvPr>
+            <p:ph type="body" idx="1"/>
+          </p:nvPr>
+        </p:nvSpPr>
+        <p:spPr/>
+        <p:txBody>
+          <a:bodyPr/>
+          <a:lstStyle/>
+          <a:p>
+            <a:r>
+              <a:rPr lang="fr-FR" sz="1200" dirty="0" smtClean="0"/>
+              <a:t>Les colonnes </a:t>
+            </a:r>
+            <a:r>
+              <a:rPr lang="fr-FR" sz="1200" dirty="0" err="1" smtClean="0"/>
+              <a:t>eltecs</a:t>
+            </a:r>
+            <a:r>
+              <a:rPr lang="fr-FR" sz="1200" dirty="0" smtClean="0"/>
+              <a:t> sont les numéros des colonnes contenant les éléments  collectés pour la recherche.</a:t>
+            </a:r>
+          </a:p>
+          <a:p>
+            <a:r>
+              <a:rPr lang="fr-FR" sz="1200" dirty="0" smtClean="0"/>
+              <a:t>Les colonnes à afficher remonteront avec les résultats.</a:t>
+            </a:r>
+          </a:p>
+          <a:p>
+            <a:r>
+              <a:rPr lang="fr-FR" sz="1200" dirty="0" smtClean="0"/>
+              <a:t>Le nombre de lignes d’entêtes est le nombre de lignes à ignorer avant les données propres.</a:t>
+            </a:r>
+          </a:p>
+          <a:p>
+            <a:endParaRPr lang="fr-FR" dirty="0"/>
+          </a:p>
+        </p:txBody>
+      </p:sp>
+      <p:sp>
+        <p:nvSpPr>
+          <p:cNvPr id="4" name="Espace réservé du numéro de diapositive 3"/>
+          <p:cNvSpPr>
+            <a:spLocks noGrp="1"/>
+          </p:cNvSpPr>
+          <p:nvPr>
+            <p:ph type="sldNum" sz="quarter" idx="10"/>
+          </p:nvPr>
+        </p:nvSpPr>
+        <p:spPr/>
+        <p:txBody>
+          <a:bodyPr/>
+          <a:lstStyle/>
+          <a:p>
+            <a:fld id="{1196F097-BE11-43AE-B31F-1224F494EECC}" type="slidenum">
+              <a:rPr lang="fr-FR" smtClean="0"/>
+              <a:pPr/>
+              <a:t>4</a:t>
+            </a:fld>
+            <a:endParaRPr lang="fr-FR"/>
+          </a:p>
+        </p:txBody>
+      </p:sp>
+    </p:spTree>
+    <p:extLst>
+      <p:ext uri="{BB962C8B-B14F-4D97-AF65-F5344CB8AC3E}">
+        <p14:creationId xmlns:p14="http://schemas.microsoft.com/office/powerpoint/2010/main" val="238856481"/>
+      </p:ext>
+    </p:extLst>
+  </p:cSld>
+  <p:clrMapOvr>
+    <a:masterClrMapping/>
+  </p:clrMapOvr>
+</p:notes>
+</file>
+
+<file path=ppt/notesSlides/notesSlide3.xml><?xml version="1.0" encoding="utf-8"?>
+<p:notes xmlns:a="http://schemas.openxmlformats.org/drawingml/2006/main" xmlns:r="http://schemas.openxmlformats.org/officeDocument/2006/relationships" xmlns:p="http://schemas.openxmlformats.org/presentationml/2006/main">
+  <p:cSld>
+    <p:spTree>
+      <p:nvGrpSpPr>
+        <p:cNvPr id="1" name=""/>
+        <p:cNvGrpSpPr/>
+        <p:nvPr/>
+      </p:nvGrpSpPr>
+      <p:grpSpPr>
+        <a:xfrm>
+          <a:off x="0" y="0"/>
+          <a:ext cx="0" cy="0"/>
+          <a:chOff x="0" y="0"/>
+          <a:chExt cx="0" cy="0"/>
+        </a:xfrm>
+      </p:grpSpPr>
+      <p:sp>
+        <p:nvSpPr>
+          <p:cNvPr id="2" name="Espace réservé de l'image des diapositives 1"/>
+          <p:cNvSpPr>
+            <a:spLocks noGrp="1" noRot="1" noChangeAspect="1"/>
+          </p:cNvSpPr>
+          <p:nvPr>
+            <p:ph type="sldImg"/>
+          </p:nvPr>
+        </p:nvSpPr>
+        <p:spPr/>
+      </p:sp>
+      <p:sp>
+        <p:nvSpPr>
+          <p:cNvPr id="3" name="Espace réservé des commentaires 2"/>
+          <p:cNvSpPr>
+            <a:spLocks noGrp="1"/>
+          </p:cNvSpPr>
+          <p:nvPr>
+            <p:ph type="body" idx="1"/>
+          </p:nvPr>
+        </p:nvSpPr>
+        <p:spPr/>
+        <p:txBody>
+          <a:bodyPr/>
+          <a:lstStyle/>
+          <a:p>
+            <a:endParaRPr lang="fr-FR" dirty="0"/>
+          </a:p>
+        </p:txBody>
+      </p:sp>
+      <p:sp>
+        <p:nvSpPr>
+          <p:cNvPr id="4" name="Espace réservé du numéro de diapositive 3"/>
+          <p:cNvSpPr>
+            <a:spLocks noGrp="1"/>
+          </p:cNvSpPr>
+          <p:nvPr>
+            <p:ph type="sldNum" sz="quarter" idx="10"/>
+          </p:nvPr>
+        </p:nvSpPr>
+        <p:spPr/>
+        <p:txBody>
+          <a:bodyPr/>
+          <a:lstStyle/>
+          <a:p>
+            <a:fld id="{1196F097-BE11-43AE-B31F-1224F494EECC}" type="slidenum">
+              <a:rPr lang="fr-FR" smtClean="0"/>
+              <a:pPr/>
+              <a:t>5</a:t>
+            </a:fld>
+            <a:endParaRPr lang="fr-FR"/>
+          </a:p>
+        </p:txBody>
+      </p:sp>
+    </p:spTree>
+    <p:extLst>
+      <p:ext uri="{BB962C8B-B14F-4D97-AF65-F5344CB8AC3E}">
+        <p14:creationId xmlns:p14="http://schemas.microsoft.com/office/powerpoint/2010/main" val="3202992686"/>
+      </p:ext>
+    </p:extLst>
+  </p:cSld>
+  <p:clrMapOvr>
+    <a:masterClrMapping/>
+  </p:clrMapOvr>
+</p:notes>
+</file>
+
 <file path=ppt/slideLayouts/slideLayout1.xml><?xml version="1.0" encoding="utf-8"?>
 <p:sldLayout xmlns:a="http://schemas.openxmlformats.org/drawingml/2006/main" xmlns:r="http://schemas.openxmlformats.org/officeDocument/2006/relationships" xmlns:p="http://schemas.openxmlformats.org/presentationml/2006/main" type="blank" preserve="1">
   <p:cSld name="Vide">
@@ -604,7 +801,7 @@
             <a:fld id="{2AD8A078-8F0D-4B44-934F-D3DB161891DE}" type="datetimeFigureOut">
               <a:rPr lang="fr-FR" smtClean="0"/>
               <a:pPr/>
-              <a:t>04/06/2022</a:t>
+              <a:t>08/02/2023</a:t>
             </a:fld>
             <a:endParaRPr lang="fr-FR"/>
           </a:p>
@@ -819,7 +1016,7 @@
             <a:fld id="{2AD8A078-8F0D-4B44-934F-D3DB161891DE}" type="datetimeFigureOut">
               <a:rPr lang="fr-FR" smtClean="0"/>
               <a:pPr/>
-              <a:t>04/06/2022</a:t>
+              <a:t>08/02/2023</a:t>
             </a:fld>
             <a:endParaRPr lang="fr-FR"/>
           </a:p>
@@ -1278,7 +1475,11 @@
             </a:r>
             <a:r>
               <a:rPr lang="fr-FR" sz="3200" b="1" dirty="0" smtClean="0"/>
-              <a:t> 0.0.5</a:t>
+              <a:t> </a:t>
+            </a:r>
+            <a:r>
+              <a:rPr lang="fr-FR" sz="3200" b="1" dirty="0" smtClean="0"/>
+              <a:t>0.0.10</a:t>
             </a:r>
             <a:endParaRPr lang="fr-FR" sz="1600" b="1" dirty="0" smtClean="0"/>
           </a:p>
@@ -1293,7 +1494,7 @@
         <p:spPr>
           <a:xfrm>
             <a:off x="152400" y="1556792"/>
-            <a:ext cx="8839200" cy="2554545"/>
+            <a:ext cx="8839200" cy="4401205"/>
           </a:xfrm>
           <a:prstGeom prst="rect">
             <a:avLst/>
@@ -1312,7 +1513,15 @@
             </a:r>
             <a:r>
               <a:rPr lang="fr-FR" sz="2000" dirty="0" smtClean="0"/>
-              <a:t> est un logiciel de recherche recoupement.</a:t>
+              <a:t> est un logiciel de recherche </a:t>
+            </a:r>
+            <a:r>
+              <a:rPr lang="fr-FR" sz="2000" dirty="0" smtClean="0"/>
+              <a:t>et de recoupement</a:t>
+            </a:r>
+            <a:r>
+              <a:rPr lang="fr-FR" sz="2000" dirty="0" smtClean="0"/>
+              <a:t>.</a:t>
             </a:r>
           </a:p>
           <a:p>
@@ -1333,9 +1542,15 @@
             </a:r>
           </a:p>
           <a:p>
+            <a:endParaRPr lang="fr-FR" sz="2000" dirty="0"/>
+          </a:p>
+          <a:p>
+            <a:endParaRPr lang="fr-FR" sz="2000" dirty="0" smtClean="0"/>
+          </a:p>
+          <a:p>
             <a:r>
               <a:rPr lang="fr-FR" sz="2000" dirty="0" smtClean="0"/>
-              <a:t>Le</a:t>
+              <a:t>Fonctionnalités</a:t>
             </a:r>
             <a:endParaRPr lang="fr-FR" sz="2000" dirty="0"/>
           </a:p>
@@ -1349,11 +1564,11 @@
             </a:pPr>
             <a:r>
               <a:rPr lang="fr-FR" sz="2000" dirty="0" smtClean="0"/>
-              <a:t>Supporte les </a:t>
+              <a:t>Supporte les fichiers TXT / CSV / </a:t>
             </a:r>
             <a:r>
               <a:rPr lang="fr-FR" sz="2000" dirty="0" smtClean="0"/>
-              <a:t>fichiers TXT / CSV / XLSX</a:t>
+              <a:t>XLSX</a:t>
             </a:r>
           </a:p>
           <a:p>
@@ -1363,8 +1578,55 @@
             </a:pPr>
             <a:r>
               <a:rPr lang="fr-FR" sz="2000" dirty="0" smtClean="0"/>
-              <a:t>Profil de fichiers pour spécifier les colonnes à rechercher et à afficher</a:t>
-            </a:r>
+              <a:t>Permet de sauvegarder des bases de données alimentées par des fichiers</a:t>
+            </a:r>
+            <a:endParaRPr lang="fr-FR" sz="2000" dirty="0" smtClean="0"/>
+          </a:p>
+          <a:p>
+            <a:pPr marL="342900" indent="-342900">
+              <a:buFontTx/>
+              <a:buChar char="-"/>
+            </a:pPr>
+            <a:r>
+              <a:rPr lang="fr-FR" sz="2000" dirty="0" smtClean="0"/>
+              <a:t>Profil de fichiers pour spécifier les colonnes à rechercher et à </a:t>
+            </a:r>
+            <a:r>
+              <a:rPr lang="fr-FR" sz="2000" dirty="0" smtClean="0"/>
+              <a:t>afficher</a:t>
+            </a:r>
+          </a:p>
+          <a:p>
+            <a:pPr marL="342900" indent="-342900">
+              <a:buFontTx/>
+              <a:buChar char="-"/>
+            </a:pPr>
+            <a:endParaRPr lang="fr-FR" sz="2000" dirty="0"/>
+          </a:p>
+          <a:p>
+            <a:pPr marL="342900" indent="-342900">
+              <a:buFontTx/>
+              <a:buChar char="-"/>
+            </a:pPr>
+            <a:r>
+              <a:rPr lang="fr-FR" sz="2000" dirty="0" smtClean="0"/>
+              <a:t>Transformation des éléments</a:t>
+            </a:r>
+          </a:p>
+          <a:p>
+            <a:pPr marL="342900" indent="-342900">
+              <a:buFontTx/>
+              <a:buChar char="-"/>
+            </a:pPr>
+            <a:r>
+              <a:rPr lang="fr-FR" sz="2000" dirty="0" smtClean="0"/>
+              <a:t>Transformation automatisée de fichiers </a:t>
+            </a:r>
+            <a:r>
+              <a:rPr lang="fr-FR" sz="2000" dirty="0" err="1" smtClean="0"/>
+              <a:t>excel</a:t>
+            </a:r>
+            <a:endParaRPr lang="fr-FR" sz="2000" dirty="0" smtClean="0"/>
           </a:p>
         </p:txBody>
       </p:sp>
@@ -1405,9 +1667,92 @@
           <a:chExt cx="0" cy="0"/>
         </a:xfrm>
       </p:grpSpPr>
+      <p:sp>
+        <p:nvSpPr>
+          <p:cNvPr id="3" name="ZoneTexte 2"/>
+          <p:cNvSpPr txBox="1"/>
+          <p:nvPr/>
+        </p:nvSpPr>
+        <p:spPr>
+          <a:xfrm>
+            <a:off x="0" y="205893"/>
+            <a:ext cx="9144000" cy="400110"/>
+          </a:xfrm>
+          <a:prstGeom prst="rect">
+            <a:avLst/>
+          </a:prstGeom>
+          <a:noFill/>
+        </p:spPr>
+        <p:txBody>
+          <a:bodyPr wrap="square" rtlCol="0">
+            <a:spAutoFit/>
+          </a:bodyPr>
+          <a:lstStyle/>
+          <a:p>
+            <a:pPr algn="ctr"/>
+            <a:r>
+              <a:rPr lang="fr-FR" sz="2000" b="1" dirty="0" smtClean="0"/>
+              <a:t>Interface de recherche</a:t>
+            </a:r>
+            <a:endParaRPr lang="fr-FR" sz="2000" b="1" dirty="0"/>
+          </a:p>
+        </p:txBody>
+      </p:sp>
+      <p:sp>
+        <p:nvSpPr>
+          <p:cNvPr id="4" name="ZoneTexte 3"/>
+          <p:cNvSpPr txBox="1"/>
+          <p:nvPr/>
+        </p:nvSpPr>
+        <p:spPr>
+          <a:xfrm>
+            <a:off x="222968" y="6054304"/>
+            <a:ext cx="8921032" cy="646331"/>
+          </a:xfrm>
+          <a:prstGeom prst="rect">
+            <a:avLst/>
+          </a:prstGeom>
+          <a:noFill/>
+        </p:spPr>
+        <p:txBody>
+          <a:bodyPr wrap="none" rtlCol="0">
+            <a:spAutoFit/>
+          </a:bodyPr>
+          <a:lstStyle/>
+          <a:p>
+            <a:r>
+              <a:rPr lang="fr-FR" dirty="0" smtClean="0"/>
+              <a:t>Interface de recherche. A gauche, les fichiers « valeurs » dans lesquels les </a:t>
+            </a:r>
+            <a:r>
+              <a:rPr lang="fr-FR" dirty="0" err="1" smtClean="0"/>
+              <a:t>eltecs</a:t>
+            </a:r>
+            <a:r>
+              <a:rPr lang="fr-FR" dirty="0" smtClean="0"/>
+              <a:t> sont extraits.</a:t>
+            </a:r>
+          </a:p>
+          <a:p>
+            <a:r>
+              <a:rPr lang="fr-FR" dirty="0" smtClean="0"/>
+              <a:t>Ces </a:t>
+            </a:r>
+            <a:r>
+              <a:rPr lang="fr-FR" dirty="0" err="1" smtClean="0"/>
+              <a:t>eltecs</a:t>
+            </a:r>
+            <a:r>
+              <a:rPr lang="fr-FR" dirty="0" smtClean="0"/>
+              <a:t> sont ensuite recherchés dans les fichiers « bases » à droite</a:t>
+            </a:r>
+            <a:endParaRPr lang="fr-FR" dirty="0"/>
+          </a:p>
+        </p:txBody>
+      </p:sp>
       <p:pic>
         <p:nvPicPr>
-          <p:cNvPr id="2" name="Image 1"/>
+          <p:cNvPr id="5" name="Image 4"/>
           <p:cNvPicPr>
             <a:picLocks noChangeAspect="1"/>
           </p:cNvPicPr>
@@ -1421,97 +1766,14 @@
         </p:blipFill>
         <p:spPr>
           <a:xfrm>
-            <a:off x="580441" y="836133"/>
-            <a:ext cx="7983118" cy="4988041"/>
+            <a:off x="514350" y="900112"/>
+            <a:ext cx="8115300" cy="5057775"/>
           </a:xfrm>
           <a:prstGeom prst="rect">
             <a:avLst/>
           </a:prstGeom>
         </p:spPr>
       </p:pic>
-      <p:sp>
-        <p:nvSpPr>
-          <p:cNvPr id="3" name="ZoneTexte 2"/>
-          <p:cNvSpPr txBox="1"/>
-          <p:nvPr/>
-        </p:nvSpPr>
-        <p:spPr>
-          <a:xfrm>
-            <a:off x="0" y="205893"/>
-            <a:ext cx="9144000" cy="400110"/>
-          </a:xfrm>
-          <a:prstGeom prst="rect">
-            <a:avLst/>
-          </a:prstGeom>
-          <a:noFill/>
-        </p:spPr>
-        <p:txBody>
-          <a:bodyPr wrap="square" rtlCol="0">
-            <a:spAutoFit/>
-          </a:bodyPr>
-          <a:lstStyle/>
-          <a:p>
-            <a:pPr algn="ctr"/>
-            <a:r>
-              <a:rPr lang="fr-FR" sz="2000" b="1" dirty="0" smtClean="0"/>
-              <a:t>Interface de recherche</a:t>
-            </a:r>
-            <a:endParaRPr lang="fr-FR" sz="2000" b="1" dirty="0"/>
-          </a:p>
-        </p:txBody>
-      </p:sp>
-      <p:sp>
-        <p:nvSpPr>
-          <p:cNvPr id="4" name="ZoneTexte 3"/>
-          <p:cNvSpPr txBox="1"/>
-          <p:nvPr/>
-        </p:nvSpPr>
-        <p:spPr>
-          <a:xfrm>
-            <a:off x="222968" y="6054304"/>
-            <a:ext cx="8921032" cy="646331"/>
-          </a:xfrm>
-          <a:prstGeom prst="rect">
-            <a:avLst/>
-          </a:prstGeom>
-          <a:noFill/>
-        </p:spPr>
-        <p:txBody>
-          <a:bodyPr wrap="none" rtlCol="0">
-            <a:spAutoFit/>
-          </a:bodyPr>
-          <a:lstStyle/>
-          <a:p>
-            <a:r>
-              <a:rPr lang="fr-FR" dirty="0" smtClean="0"/>
-              <a:t>Interface de recherche. A gauche, les fichiers « valeurs » dans lesquels les </a:t>
-            </a:r>
-            <a:r>
-              <a:rPr lang="fr-FR" dirty="0" err="1" smtClean="0"/>
-              <a:t>eltecs</a:t>
-            </a:r>
-            <a:r>
-              <a:rPr lang="fr-FR" dirty="0" smtClean="0"/>
-              <a:t> sont extraits.</a:t>
-            </a:r>
-          </a:p>
-          <a:p>
-            <a:r>
-              <a:rPr lang="fr-FR" dirty="0" smtClean="0"/>
-              <a:t>Ces </a:t>
-            </a:r>
-            <a:r>
-              <a:rPr lang="fr-FR" dirty="0" err="1" smtClean="0"/>
-              <a:t>eltecs</a:t>
-            </a:r>
-            <a:r>
-              <a:rPr lang="fr-FR" dirty="0" smtClean="0"/>
-              <a:t> sont ensuite recherchés dans les fichiers « bases » à droite</a:t>
-            </a:r>
-            <a:endParaRPr lang="fr-FR" dirty="0"/>
-          </a:p>
-        </p:txBody>
-      </p:sp>
     </p:spTree>
     <p:extLst>
       <p:ext uri="{BB962C8B-B14F-4D97-AF65-F5344CB8AC3E}">
@@ -1544,7 +1806,7 @@
       </p:grpSpPr>
       <p:pic>
         <p:nvPicPr>
-          <p:cNvPr id="2" name="Image 1"/>
+          <p:cNvPr id="10" name="Image 9"/>
           <p:cNvPicPr>
             <a:picLocks noChangeAspect="1"/>
           </p:cNvPicPr>
@@ -1558,8 +1820,8 @@
         </p:blipFill>
         <p:spPr>
           <a:xfrm>
-            <a:off x="156174" y="1109393"/>
-            <a:ext cx="4552950" cy="3181350"/>
+            <a:off x="4865539" y="1459462"/>
+            <a:ext cx="4181475" cy="3505200"/>
           </a:xfrm>
           <a:prstGeom prst="rect">
             <a:avLst/>
@@ -1568,7 +1830,7 @@
       </p:pic>
       <p:pic>
         <p:nvPicPr>
-          <p:cNvPr id="3" name="Image 2"/>
+          <p:cNvPr id="9" name="Image 8"/>
           <p:cNvPicPr>
             <a:picLocks noChangeAspect="1"/>
           </p:cNvPicPr>
@@ -1582,8 +1844,8 @@
         </p:blipFill>
         <p:spPr>
           <a:xfrm>
-            <a:off x="4865540" y="1467014"/>
-            <a:ext cx="4181475" cy="3848100"/>
+            <a:off x="156174" y="1106805"/>
+            <a:ext cx="4552950" cy="3181350"/>
           </a:xfrm>
           <a:prstGeom prst="rect">
             <a:avLst/>
@@ -1710,8 +1972,8 @@
         </p:nvSpPr>
         <p:spPr>
           <a:xfrm>
-            <a:off x="4865540" y="1459462"/>
-            <a:ext cx="4181475" cy="3855651"/>
+            <a:off x="4865540" y="1459463"/>
+            <a:ext cx="4181475" cy="3505200"/>
           </a:xfrm>
           <a:prstGeom prst="rect">
             <a:avLst/>
@@ -1826,22 +2088,22 @@
       </p:grpSpPr>
       <p:pic>
         <p:nvPicPr>
-          <p:cNvPr id="2" name="Image 1"/>
+          <p:cNvPr id="6" name="Image 5"/>
           <p:cNvPicPr>
             <a:picLocks noChangeAspect="1"/>
           </p:cNvPicPr>
           <p:nvPr/>
         </p:nvPicPr>
         <p:blipFill>
-          <a:blip r:embed="rId2"/>
+          <a:blip r:embed="rId3"/>
           <a:stretch>
             <a:fillRect/>
           </a:stretch>
         </p:blipFill>
         <p:spPr>
           <a:xfrm>
-            <a:off x="419100" y="1452562"/>
-            <a:ext cx="8305800" cy="3952875"/>
+            <a:off x="864870" y="857295"/>
+            <a:ext cx="7414260" cy="4446855"/>
           </a:xfrm>
           <a:prstGeom prst="rect">
             <a:avLst/>
@@ -1887,7 +2149,7 @@
         </p:nvSpPr>
         <p:spPr>
           <a:xfrm>
-            <a:off x="419101" y="5555443"/>
+            <a:off x="419101" y="5418283"/>
             <a:ext cx="8420100" cy="954107"/>
           </a:xfrm>
           <a:prstGeom prst="rect">
@@ -1903,35 +2165,21 @@
           <a:p>
             <a:r>
               <a:rPr lang="fr-FR" sz="1400" dirty="0" smtClean="0"/>
-              <a:t>Cette interface sert à définir les profils de fichier à exploiter.</a:t>
-            </a:r>
-          </a:p>
-          <a:p>
+              <a:t>Cette interface sert à définir les profils </a:t>
+            </a:r>
             <a:r>
               <a:rPr lang="fr-FR" sz="1400" dirty="0" smtClean="0"/>
-              <a:t>Les colonnes </a:t>
-            </a:r>
-            <a:r>
-              <a:rPr lang="fr-FR" sz="1400" dirty="0" err="1" smtClean="0"/>
-              <a:t>eltecs</a:t>
-            </a:r>
+              <a:t>de fichier.</a:t>
+            </a:r>
+          </a:p>
+          <a:p>
             <a:r>
               <a:rPr lang="fr-FR" sz="1400" dirty="0" smtClean="0"/>
-              <a:t> sont les numéros des colonnes contenant les éléments  collectés pour la recherche.</a:t>
-            </a:r>
-          </a:p>
-          <a:p>
-            <a:r>
-              <a:rPr lang="fr-FR" sz="1400" dirty="0" smtClean="0"/>
-              <a:t>Les colonnes à afficher remonteront avec les résultats.</a:t>
-            </a:r>
-          </a:p>
-          <a:p>
-            <a:r>
-              <a:rPr lang="fr-FR" sz="1400" dirty="0" smtClean="0"/>
-              <a:t>Le nombre de lignes d’entêtes est le nombre de lignes à ignorer avant les données propres.</a:t>
-            </a:r>
-            <a:endParaRPr lang="fr-FR" sz="1400" dirty="0"/>
+              <a:t>Un profil détermine dans quelles colonnes l’outil doit chercher des valeurs, et quelles colonnes doivent être affichées dans le résultat.</a:t>
+            </a:r>
+          </a:p>
+          <a:p>
+            <a:endParaRPr lang="fr-FR" sz="1400" dirty="0" smtClean="0"/>
           </a:p>
         </p:txBody>
       </p:sp>
@@ -1943,8 +2191,8 @@
         </p:nvSpPr>
         <p:spPr>
           <a:xfrm>
-            <a:off x="4378035" y="1787235"/>
-            <a:ext cx="4239491" cy="3618201"/>
+            <a:off x="4389120" y="857295"/>
+            <a:ext cx="3890010" cy="4446855"/>
           </a:xfrm>
           <a:prstGeom prst="rect">
             <a:avLst/>
@@ -1994,6 +2242,185 @@
 </file>
 
 <file path=ppt/slides/slide5.xml><?xml version="1.0" encoding="utf-8"?>
+<p:sld xmlns:a="http://schemas.openxmlformats.org/drawingml/2006/main" xmlns:r="http://schemas.openxmlformats.org/officeDocument/2006/relationships" xmlns:p="http://schemas.openxmlformats.org/presentationml/2006/main">
+  <p:cSld>
+    <p:spTree>
+      <p:nvGrpSpPr>
+        <p:cNvPr id="1" name=""/>
+        <p:cNvGrpSpPr/>
+        <p:nvPr/>
+      </p:nvGrpSpPr>
+      <p:grpSpPr>
+        <a:xfrm>
+          <a:off x="0" y="0"/>
+          <a:ext cx="0" cy="0"/>
+          <a:chOff x="0" y="0"/>
+          <a:chExt cx="0" cy="0"/>
+        </a:xfrm>
+      </p:grpSpPr>
+      <p:pic>
+        <p:nvPicPr>
+          <p:cNvPr id="6" name="Image 5"/>
+          <p:cNvPicPr>
+            <a:picLocks noChangeAspect="1"/>
+          </p:cNvPicPr>
+          <p:nvPr/>
+        </p:nvPicPr>
+        <p:blipFill>
+          <a:blip r:embed="rId3"/>
+          <a:stretch>
+            <a:fillRect/>
+          </a:stretch>
+        </p:blipFill>
+        <p:spPr>
+          <a:xfrm>
+            <a:off x="864870" y="857295"/>
+            <a:ext cx="7414260" cy="4446855"/>
+          </a:xfrm>
+          <a:prstGeom prst="rect">
+            <a:avLst/>
+          </a:prstGeom>
+        </p:spPr>
+      </p:pic>
+      <p:sp>
+        <p:nvSpPr>
+          <p:cNvPr id="3" name="ZoneTexte 2"/>
+          <p:cNvSpPr txBox="1"/>
+          <p:nvPr/>
+        </p:nvSpPr>
+        <p:spPr>
+          <a:xfrm>
+            <a:off x="0" y="205893"/>
+            <a:ext cx="9144000" cy="400110"/>
+          </a:xfrm>
+          <a:prstGeom prst="rect">
+            <a:avLst/>
+          </a:prstGeom>
+          <a:noFill/>
+        </p:spPr>
+        <p:txBody>
+          <a:bodyPr wrap="square" rtlCol="0">
+            <a:spAutoFit/>
+          </a:bodyPr>
+          <a:lstStyle/>
+          <a:p>
+            <a:pPr algn="ctr"/>
+            <a:r>
+              <a:rPr lang="fr-FR" sz="2000" b="1" dirty="0" smtClean="0"/>
+              <a:t>Gestion des profils</a:t>
+            </a:r>
+            <a:endParaRPr lang="fr-FR" sz="2000" b="1" dirty="0"/>
+          </a:p>
+        </p:txBody>
+      </p:sp>
+      <p:sp>
+        <p:nvSpPr>
+          <p:cNvPr id="4" name="ZoneTexte 3"/>
+          <p:cNvSpPr txBox="1"/>
+          <p:nvPr/>
+        </p:nvSpPr>
+        <p:spPr>
+          <a:xfrm>
+            <a:off x="419101" y="5418283"/>
+            <a:ext cx="8420100" cy="954107"/>
+          </a:xfrm>
+          <a:prstGeom prst="rect">
+            <a:avLst/>
+          </a:prstGeom>
+          <a:noFill/>
+        </p:spPr>
+        <p:txBody>
+          <a:bodyPr wrap="square" rtlCol="0">
+            <a:spAutoFit/>
+          </a:bodyPr>
+          <a:lstStyle/>
+          <a:p>
+            <a:r>
+              <a:rPr lang="fr-FR" sz="1400" dirty="0" smtClean="0"/>
+              <a:t>Profil d’actions</a:t>
+            </a:r>
+          </a:p>
+          <a:p>
+            <a:r>
+              <a:rPr lang="fr-FR" sz="1400" dirty="0" smtClean="0"/>
+              <a:t>Définit une liste d’actions à effectuer sur un fichier </a:t>
+            </a:r>
+            <a:r>
+              <a:rPr lang="fr-FR" sz="1400" dirty="0" err="1" smtClean="0"/>
+              <a:t>excel</a:t>
+            </a:r>
+            <a:endParaRPr lang="fr-FR" sz="1400" dirty="0" smtClean="0"/>
+          </a:p>
+          <a:p>
+            <a:r>
+              <a:rPr lang="fr-FR" sz="1400" dirty="0" smtClean="0"/>
+              <a:t>Il est possible d’insérer, de supprimer, de déplacer, dupliquer ou transformer une ligne ou une colonne</a:t>
+            </a:r>
+          </a:p>
+          <a:p>
+            <a:endParaRPr lang="fr-FR" sz="1400" dirty="0" smtClean="0"/>
+          </a:p>
+        </p:txBody>
+      </p:sp>
+      <p:sp>
+        <p:nvSpPr>
+          <p:cNvPr id="5" name="Rectangle 4"/>
+          <p:cNvSpPr/>
+          <p:nvPr/>
+        </p:nvSpPr>
+        <p:spPr>
+          <a:xfrm>
+            <a:off x="864870" y="857295"/>
+            <a:ext cx="3548868" cy="4446855"/>
+          </a:xfrm>
+          <a:prstGeom prst="rect">
+            <a:avLst/>
+          </a:prstGeom>
+          <a:solidFill>
+            <a:schemeClr val="tx1">
+              <a:alpha val="70000"/>
+            </a:schemeClr>
+          </a:solidFill>
+        </p:spPr>
+        <p:style>
+          <a:lnRef idx="2">
+            <a:schemeClr val="accent1">
+              <a:shade val="50000"/>
+            </a:schemeClr>
+          </a:lnRef>
+          <a:fillRef idx="1">
+            <a:schemeClr val="accent1"/>
+          </a:fillRef>
+          <a:effectRef idx="0">
+            <a:schemeClr val="accent1"/>
+          </a:effectRef>
+          <a:fontRef idx="minor">
+            <a:schemeClr val="lt1"/>
+          </a:fontRef>
+        </p:style>
+        <p:txBody>
+          <a:bodyPr rtlCol="0" anchor="ctr"/>
+          <a:lstStyle/>
+          <a:p>
+            <a:pPr algn="ctr"/>
+            <a:endParaRPr lang="fr-FR"/>
+          </a:p>
+        </p:txBody>
+      </p:sp>
+    </p:spTree>
+    <p:extLst>
+      <p:ext uri="{BB962C8B-B14F-4D97-AF65-F5344CB8AC3E}">
+        <p14:creationId xmlns:p14="http://schemas.microsoft.com/office/powerpoint/2010/main" val="685467908"/>
+      </p:ext>
+    </p:extLst>
+  </p:cSld>
+  <p:clrMapOvr>
+    <a:masterClrMapping/>
+  </p:clrMapOvr>
+</p:sld>
+</file>
+
+<file path=ppt/slides/slide6.xml><?xml version="1.0" encoding="utf-8"?>
 <p:sld xmlns:a="http://schemas.openxmlformats.org/drawingml/2006/main" xmlns:r="http://schemas.openxmlformats.org/officeDocument/2006/relationships" xmlns:p="http://schemas.openxmlformats.org/presentationml/2006/main">
   <p:cSld>
     <p:spTree>

</xml_diff>